<commit_message>
Revised diagram and bullet list
</commit_message>
<xml_diff>
--- a/docs/images/trend-micro-control-tower-architecture-diagram.pptx
+++ b/docs/images/trend-micro-control-tower-architecture-diagram.pptx
@@ -259,7 +259,7 @@
           <a:p>
             <a:fld id="{ADA85DEE-7315-314A-B60C-A7F72F0C0570}" type="datetimeFigureOut">
               <a:rPr lang="en-US" smtClean="0"/>
-              <a:t>7/20/2021</a:t>
+              <a:t>7/28/2021</a:t>
             </a:fld>
             <a:endParaRPr lang="en-US"/>
           </a:p>
@@ -457,7 +457,7 @@
           <a:p>
             <a:fld id="{ADA85DEE-7315-314A-B60C-A7F72F0C0570}" type="datetimeFigureOut">
               <a:rPr lang="en-US" smtClean="0"/>
-              <a:t>7/20/2021</a:t>
+              <a:t>7/28/2021</a:t>
             </a:fld>
             <a:endParaRPr lang="en-US"/>
           </a:p>
@@ -665,7 +665,7 @@
           <a:p>
             <a:fld id="{ADA85DEE-7315-314A-B60C-A7F72F0C0570}" type="datetimeFigureOut">
               <a:rPr lang="en-US" smtClean="0"/>
-              <a:t>7/20/2021</a:t>
+              <a:t>7/28/2021</a:t>
             </a:fld>
             <a:endParaRPr lang="en-US"/>
           </a:p>
@@ -863,7 +863,7 @@
           <a:p>
             <a:fld id="{ADA85DEE-7315-314A-B60C-A7F72F0C0570}" type="datetimeFigureOut">
               <a:rPr lang="en-US" smtClean="0"/>
-              <a:t>7/20/2021</a:t>
+              <a:t>7/28/2021</a:t>
             </a:fld>
             <a:endParaRPr lang="en-US"/>
           </a:p>
@@ -1138,7 +1138,7 @@
           <a:p>
             <a:fld id="{ADA85DEE-7315-314A-B60C-A7F72F0C0570}" type="datetimeFigureOut">
               <a:rPr lang="en-US" smtClean="0"/>
-              <a:t>7/20/2021</a:t>
+              <a:t>7/28/2021</a:t>
             </a:fld>
             <a:endParaRPr lang="en-US"/>
           </a:p>
@@ -1403,7 +1403,7 @@
           <a:p>
             <a:fld id="{ADA85DEE-7315-314A-B60C-A7F72F0C0570}" type="datetimeFigureOut">
               <a:rPr lang="en-US" smtClean="0"/>
-              <a:t>7/20/2021</a:t>
+              <a:t>7/28/2021</a:t>
             </a:fld>
             <a:endParaRPr lang="en-US"/>
           </a:p>
@@ -1815,7 +1815,7 @@
           <a:p>
             <a:fld id="{ADA85DEE-7315-314A-B60C-A7F72F0C0570}" type="datetimeFigureOut">
               <a:rPr lang="en-US" smtClean="0"/>
-              <a:t>7/20/2021</a:t>
+              <a:t>7/28/2021</a:t>
             </a:fld>
             <a:endParaRPr lang="en-US"/>
           </a:p>
@@ -1956,7 +1956,7 @@
           <a:p>
             <a:fld id="{ADA85DEE-7315-314A-B60C-A7F72F0C0570}" type="datetimeFigureOut">
               <a:rPr lang="en-US" smtClean="0"/>
-              <a:t>7/20/2021</a:t>
+              <a:t>7/28/2021</a:t>
             </a:fld>
             <a:endParaRPr lang="en-US"/>
           </a:p>
@@ -2069,7 +2069,7 @@
           <a:p>
             <a:fld id="{ADA85DEE-7315-314A-B60C-A7F72F0C0570}" type="datetimeFigureOut">
               <a:rPr lang="en-US" smtClean="0"/>
-              <a:t>7/20/2021</a:t>
+              <a:t>7/28/2021</a:t>
             </a:fld>
             <a:endParaRPr lang="en-US"/>
           </a:p>
@@ -2380,7 +2380,7 @@
           <a:p>
             <a:fld id="{ADA85DEE-7315-314A-B60C-A7F72F0C0570}" type="datetimeFigureOut">
               <a:rPr lang="en-US" smtClean="0"/>
-              <a:t>7/20/2021</a:t>
+              <a:t>7/28/2021</a:t>
             </a:fld>
             <a:endParaRPr lang="en-US"/>
           </a:p>
@@ -2668,7 +2668,7 @@
           <a:p>
             <a:fld id="{ADA85DEE-7315-314A-B60C-A7F72F0C0570}" type="datetimeFigureOut">
               <a:rPr lang="en-US" smtClean="0"/>
-              <a:t>7/20/2021</a:t>
+              <a:t>7/28/2021</a:t>
             </a:fld>
             <a:endParaRPr lang="en-US"/>
           </a:p>
@@ -2909,7 +2909,7 @@
           <a:p>
             <a:fld id="{ADA85DEE-7315-314A-B60C-A7F72F0C0570}" type="datetimeFigureOut">
               <a:rPr lang="en-US" smtClean="0"/>
-              <a:t>7/20/2021</a:t>
+              <a:t>7/28/2021</a:t>
             </a:fld>
             <a:endParaRPr lang="en-US"/>
           </a:p>
@@ -4370,8 +4370,8 @@
         </p:nvSpPr>
         <p:spPr bwMode="auto">
           <a:xfrm>
-            <a:off x="2988362" y="5124631"/>
-            <a:ext cx="822960" cy="274320"/>
+            <a:off x="2626052" y="5133257"/>
+            <a:ext cx="1554480" cy="274320"/>
           </a:xfrm>
           <a:prstGeom prst="rect">
             <a:avLst/>
@@ -4510,7 +4510,7 @@
                 <a:ea typeface="Amazon Ember" panose="020B0603020204020204" pitchFamily="34" charset="0"/>
                 <a:cs typeface="Arial" panose="020B0604020202020204" pitchFamily="34" charset="0"/>
               </a:rPr>
-              <a:t>Event rule</a:t>
+              <a:t>Amazon EventBridge event rule</a:t>
             </a:r>
             <a:endParaRPr lang="en-US" altLang="en-US" sz="1100" dirty="0">
               <a:latin typeface="Arial" panose="020B0604020202020204" pitchFamily="34" charset="0"/>
@@ -5268,6 +5268,15 @@
         <p:blipFill>
           <a:blip r:embed="rId12">
             <a:extLst>
+              <a:ext uri="{BEBA8EAE-BF5A-486C-A8C5-ECC9F3942E4B}">
+                <a14:imgProps xmlns:a14="http://schemas.microsoft.com/office/drawing/2010/main">
+                  <a14:imgLayer r:embed="rId13">
+                    <a14:imgEffect>
+                      <a14:artisticBlur/>
+                    </a14:imgEffect>
+                  </a14:imgLayer>
+                </a14:imgProps>
+              </a:ext>
               <a:ext uri="{28A0092B-C50C-407E-A947-70E740481C1C}">
                 <a14:useLocalDpi xmlns:a14="http://schemas.microsoft.com/office/drawing/2010/main" val="0"/>
               </a:ext>
@@ -5328,7 +5337,7 @@
         <p:spPr bwMode="auto">
           <a:xfrm>
             <a:off x="7575044" y="2420503"/>
-            <a:ext cx="1115568" cy="430887"/>
+            <a:ext cx="1115568" cy="600164"/>
           </a:xfrm>
           <a:prstGeom prst="rect">
             <a:avLst/>
@@ -5467,7 +5476,7 @@
                 <a:ea typeface="Amazon Ember" panose="020B0603020204020204" pitchFamily="34" charset="0"/>
                 <a:cs typeface="Arial" panose="020B0604020202020204" pitchFamily="34" charset="0"/>
               </a:rPr>
-              <a:t>Protected EC2 instance</a:t>
+              <a:t>Protected Amazon EC2 instance</a:t>
             </a:r>
             <a:endParaRPr lang="en-US" altLang="en-US" sz="1100" dirty="0">
               <a:latin typeface="Arial" panose="020B0604020202020204" pitchFamily="34" charset="0"/>
@@ -5800,7 +5809,7 @@
                 <a:latin typeface="Arial" panose="020B0604020202020204" pitchFamily="34" charset="0"/>
                 <a:cs typeface="Arial" panose="020B0604020202020204" pitchFamily="34" charset="0"/>
               </a:rPr>
-              <a:t>Control Tower Management Account</a:t>
+              <a:t>AWS Control Tower management account</a:t>
             </a:r>
           </a:p>
         </p:txBody>
@@ -6010,7 +6019,7 @@
           <p:nvPr/>
         </p:nvPicPr>
         <p:blipFill>
-          <a:blip r:embed="rId13">
+          <a:blip r:embed="rId14">
             <a:extLst>
               <a:ext uri="{96DAC541-7B7A-43D3-8B79-37D633B846F1}">
                 <asvg:svgBlip xmlns="" xmlns:asvg="http://schemas.microsoft.com/office/drawing/2016/SVG/main" r:embed="rId20"/>

</xml_diff>

<commit_message>
Production doc builds - 2021/08/02 22:41:10 UTC
</commit_message>
<xml_diff>
--- a/docs/images/trend-micro-control-tower-architecture-diagram.pptx
+++ b/docs/images/trend-micro-control-tower-architecture-diagram.pptx
@@ -259,7 +259,7 @@
           <a:p>
             <a:fld id="{ADA85DEE-7315-314A-B60C-A7F72F0C0570}" type="datetimeFigureOut">
               <a:rPr lang="en-US" smtClean="0"/>
-              <a:t>7/20/2021</a:t>
+              <a:t>7/28/2021</a:t>
             </a:fld>
             <a:endParaRPr lang="en-US"/>
           </a:p>
@@ -457,7 +457,7 @@
           <a:p>
             <a:fld id="{ADA85DEE-7315-314A-B60C-A7F72F0C0570}" type="datetimeFigureOut">
               <a:rPr lang="en-US" smtClean="0"/>
-              <a:t>7/20/2021</a:t>
+              <a:t>7/28/2021</a:t>
             </a:fld>
             <a:endParaRPr lang="en-US"/>
           </a:p>
@@ -665,7 +665,7 @@
           <a:p>
             <a:fld id="{ADA85DEE-7315-314A-B60C-A7F72F0C0570}" type="datetimeFigureOut">
               <a:rPr lang="en-US" smtClean="0"/>
-              <a:t>7/20/2021</a:t>
+              <a:t>7/28/2021</a:t>
             </a:fld>
             <a:endParaRPr lang="en-US"/>
           </a:p>
@@ -863,7 +863,7 @@
           <a:p>
             <a:fld id="{ADA85DEE-7315-314A-B60C-A7F72F0C0570}" type="datetimeFigureOut">
               <a:rPr lang="en-US" smtClean="0"/>
-              <a:t>7/20/2021</a:t>
+              <a:t>7/28/2021</a:t>
             </a:fld>
             <a:endParaRPr lang="en-US"/>
           </a:p>
@@ -1138,7 +1138,7 @@
           <a:p>
             <a:fld id="{ADA85DEE-7315-314A-B60C-A7F72F0C0570}" type="datetimeFigureOut">
               <a:rPr lang="en-US" smtClean="0"/>
-              <a:t>7/20/2021</a:t>
+              <a:t>7/28/2021</a:t>
             </a:fld>
             <a:endParaRPr lang="en-US"/>
           </a:p>
@@ -1403,7 +1403,7 @@
           <a:p>
             <a:fld id="{ADA85DEE-7315-314A-B60C-A7F72F0C0570}" type="datetimeFigureOut">
               <a:rPr lang="en-US" smtClean="0"/>
-              <a:t>7/20/2021</a:t>
+              <a:t>7/28/2021</a:t>
             </a:fld>
             <a:endParaRPr lang="en-US"/>
           </a:p>
@@ -1815,7 +1815,7 @@
           <a:p>
             <a:fld id="{ADA85DEE-7315-314A-B60C-A7F72F0C0570}" type="datetimeFigureOut">
               <a:rPr lang="en-US" smtClean="0"/>
-              <a:t>7/20/2021</a:t>
+              <a:t>7/28/2021</a:t>
             </a:fld>
             <a:endParaRPr lang="en-US"/>
           </a:p>
@@ -1956,7 +1956,7 @@
           <a:p>
             <a:fld id="{ADA85DEE-7315-314A-B60C-A7F72F0C0570}" type="datetimeFigureOut">
               <a:rPr lang="en-US" smtClean="0"/>
-              <a:t>7/20/2021</a:t>
+              <a:t>7/28/2021</a:t>
             </a:fld>
             <a:endParaRPr lang="en-US"/>
           </a:p>
@@ -2069,7 +2069,7 @@
           <a:p>
             <a:fld id="{ADA85DEE-7315-314A-B60C-A7F72F0C0570}" type="datetimeFigureOut">
               <a:rPr lang="en-US" smtClean="0"/>
-              <a:t>7/20/2021</a:t>
+              <a:t>7/28/2021</a:t>
             </a:fld>
             <a:endParaRPr lang="en-US"/>
           </a:p>
@@ -2380,7 +2380,7 @@
           <a:p>
             <a:fld id="{ADA85DEE-7315-314A-B60C-A7F72F0C0570}" type="datetimeFigureOut">
               <a:rPr lang="en-US" smtClean="0"/>
-              <a:t>7/20/2021</a:t>
+              <a:t>7/28/2021</a:t>
             </a:fld>
             <a:endParaRPr lang="en-US"/>
           </a:p>
@@ -2668,7 +2668,7 @@
           <a:p>
             <a:fld id="{ADA85DEE-7315-314A-B60C-A7F72F0C0570}" type="datetimeFigureOut">
               <a:rPr lang="en-US" smtClean="0"/>
-              <a:t>7/20/2021</a:t>
+              <a:t>7/28/2021</a:t>
             </a:fld>
             <a:endParaRPr lang="en-US"/>
           </a:p>
@@ -2909,7 +2909,7 @@
           <a:p>
             <a:fld id="{ADA85DEE-7315-314A-B60C-A7F72F0C0570}" type="datetimeFigureOut">
               <a:rPr lang="en-US" smtClean="0"/>
-              <a:t>7/20/2021</a:t>
+              <a:t>7/28/2021</a:t>
             </a:fld>
             <a:endParaRPr lang="en-US"/>
           </a:p>
@@ -4370,8 +4370,8 @@
         </p:nvSpPr>
         <p:spPr bwMode="auto">
           <a:xfrm>
-            <a:off x="2988362" y="5124631"/>
-            <a:ext cx="822960" cy="274320"/>
+            <a:off x="2626052" y="5133257"/>
+            <a:ext cx="1554480" cy="274320"/>
           </a:xfrm>
           <a:prstGeom prst="rect">
             <a:avLst/>
@@ -4510,7 +4510,7 @@
                 <a:ea typeface="Amazon Ember" panose="020B0603020204020204" pitchFamily="34" charset="0"/>
                 <a:cs typeface="Arial" panose="020B0604020202020204" pitchFamily="34" charset="0"/>
               </a:rPr>
-              <a:t>Event rule</a:t>
+              <a:t>Amazon EventBridge event rule</a:t>
             </a:r>
             <a:endParaRPr lang="en-US" altLang="en-US" sz="1100" dirty="0">
               <a:latin typeface="Arial" panose="020B0604020202020204" pitchFamily="34" charset="0"/>
@@ -5268,6 +5268,15 @@
         <p:blipFill>
           <a:blip r:embed="rId12">
             <a:extLst>
+              <a:ext uri="{BEBA8EAE-BF5A-486C-A8C5-ECC9F3942E4B}">
+                <a14:imgProps xmlns:a14="http://schemas.microsoft.com/office/drawing/2010/main">
+                  <a14:imgLayer r:embed="rId13">
+                    <a14:imgEffect>
+                      <a14:artisticBlur/>
+                    </a14:imgEffect>
+                  </a14:imgLayer>
+                </a14:imgProps>
+              </a:ext>
               <a:ext uri="{28A0092B-C50C-407E-A947-70E740481C1C}">
                 <a14:useLocalDpi xmlns:a14="http://schemas.microsoft.com/office/drawing/2010/main" val="0"/>
               </a:ext>
@@ -5328,7 +5337,7 @@
         <p:spPr bwMode="auto">
           <a:xfrm>
             <a:off x="7575044" y="2420503"/>
-            <a:ext cx="1115568" cy="430887"/>
+            <a:ext cx="1115568" cy="600164"/>
           </a:xfrm>
           <a:prstGeom prst="rect">
             <a:avLst/>
@@ -5467,7 +5476,7 @@
                 <a:ea typeface="Amazon Ember" panose="020B0603020204020204" pitchFamily="34" charset="0"/>
                 <a:cs typeface="Arial" panose="020B0604020202020204" pitchFamily="34" charset="0"/>
               </a:rPr>
-              <a:t>Protected EC2 instance</a:t>
+              <a:t>Protected Amazon EC2 instance</a:t>
             </a:r>
             <a:endParaRPr lang="en-US" altLang="en-US" sz="1100" dirty="0">
               <a:latin typeface="Arial" panose="020B0604020202020204" pitchFamily="34" charset="0"/>
@@ -5800,7 +5809,7 @@
                 <a:latin typeface="Arial" panose="020B0604020202020204" pitchFamily="34" charset="0"/>
                 <a:cs typeface="Arial" panose="020B0604020202020204" pitchFamily="34" charset="0"/>
               </a:rPr>
-              <a:t>Control Tower Management Account</a:t>
+              <a:t>AWS Control Tower management account</a:t>
             </a:r>
           </a:p>
         </p:txBody>
@@ -6010,7 +6019,7 @@
           <p:nvPr/>
         </p:nvPicPr>
         <p:blipFill>
-          <a:blip r:embed="rId13">
+          <a:blip r:embed="rId14">
             <a:extLst>
               <a:ext uri="{96DAC541-7B7A-43D3-8B79-37D633B846F1}">
                 <asvg:svgBlip xmlns="" xmlns:asvg="http://schemas.microsoft.com/office/drawing/2016/SVG/main" r:embed="rId20"/>

</xml_diff>